<commit_message>
esto es nuevo wey
</commit_message>
<xml_diff>
--- a/archivos/documentacion/Presentacion/Presentacion.pptx
+++ b/archivos/documentacion/Presentacion/Presentacion.pptx
@@ -7,8 +7,8 @@
   <p:sldIdLst>
     <p:sldId id="256" r:id="rId2"/>
     <p:sldId id="257" r:id="rId3"/>
-    <p:sldId id="259" r:id="rId4"/>
-    <p:sldId id="261" r:id="rId5"/>
+    <p:sldId id="261" r:id="rId4"/>
+    <p:sldId id="259" r:id="rId5"/>
     <p:sldId id="260" r:id="rId6"/>
     <p:sldId id="262" r:id="rId7"/>
     <p:sldId id="263" r:id="rId8"/>
@@ -118,7 +118,7 @@
   </p:defaultTextStyle>
   <p:extLst>
     <p:ext uri="{521415D9-36F7-43E2-AB2F-B90AF26B5E84}">
-      <p14:sectionLst xmlns="" xmlns:p14="http://schemas.microsoft.com/office/powerpoint/2010/main">
+      <p14:sectionLst xmlns:p14="http://schemas.microsoft.com/office/powerpoint/2010/main">
         <p14:section name="Sección predeterminada" id="{2CDDEA89-5FFE-7042-886C-6EE946F94C38}">
           <p14:sldIdLst>
             <p14:sldId id="256"/>
@@ -127,14 +127,15 @@
         </p14:section>
         <p14:section name="kjkhj" id="{73C70B93-36D2-0B4E-8AF3-6AFFB29B9D4A}">
           <p14:sldIdLst>
+            <p14:sldId id="261"/>
             <p14:sldId id="259"/>
-            <p14:sldId id="261"/>
             <p14:sldId id="260"/>
             <p14:sldId id="262"/>
             <p14:sldId id="263"/>
             <p14:sldId id="270"/>
             <p14:sldId id="271"/>
             <p14:sldId id="265"/>
+            <p14:sldId id="272"/>
             <p14:sldId id="267"/>
             <p14:sldId id="269"/>
           </p14:sldIdLst>
@@ -376,7 +377,7 @@
             <a:fld id="{3F150D65-C64D-44FB-9152-4CC2DE0C9198}" type="datetime1">
               <a:rPr lang="en-US" smtClean="0"/>
               <a:pPr/>
-              <a:t>10/2/2013</a:t>
+              <a:t>10/3/2013</a:t>
             </a:fld>
             <a:endParaRPr lang="en-US"/>
           </a:p>
@@ -591,7 +592,7 @@
             <a:fld id="{42635EB0-D091-417E-ACD5-D65E1C7D8524}" type="datetime1">
               <a:rPr lang="en-US" smtClean="0"/>
               <a:pPr/>
-              <a:t>10/2/2013</a:t>
+              <a:t>10/3/2013</a:t>
             </a:fld>
             <a:endParaRPr lang="en-US"/>
           </a:p>
@@ -768,7 +769,7 @@
             <a:fld id="{7FCA09F9-C7D6-4C52-A7E8-5101239A0BA2}" type="datetime1">
               <a:rPr lang="en-US" smtClean="0"/>
               <a:pPr/>
-              <a:t>10/2/2013</a:t>
+              <a:t>10/3/2013</a:t>
             </a:fld>
             <a:endParaRPr lang="en-US"/>
           </a:p>
@@ -935,7 +936,7 @@
             <a:fld id="{0FFE64A4-35FB-42B6-9183-2C0CE0E36649}" type="datetime1">
               <a:rPr lang="en-US" smtClean="0"/>
               <a:pPr/>
-              <a:t>10/2/2013</a:t>
+              <a:t>10/3/2013</a:t>
             </a:fld>
             <a:endParaRPr lang="en-US"/>
           </a:p>
@@ -1221,7 +1222,7 @@
             <a:fld id="{2A2683B9-6ECA-47FA-93CF-B124A0FAC208}" type="datetime1">
               <a:rPr lang="en-US" smtClean="0"/>
               <a:pPr/>
-              <a:t>10/2/2013</a:t>
+              <a:t>10/3/2013</a:t>
             </a:fld>
             <a:endParaRPr lang="en-US"/>
           </a:p>
@@ -1549,7 +1550,7 @@
             <a:fld id="{305FF66B-9476-4BB3-85E9-E01854F07F90}" type="datetime1">
               <a:rPr lang="en-US" smtClean="0"/>
               <a:pPr/>
-              <a:t>10/2/2013</a:t>
+              <a:t>10/3/2013</a:t>
             </a:fld>
             <a:endParaRPr lang="en-US"/>
           </a:p>
@@ -1976,7 +1977,7 @@
             <a:fld id="{56B23FBD-8F7D-4F85-8085-67BFDB05CB71}" type="datetime1">
               <a:rPr lang="en-US" smtClean="0"/>
               <a:pPr/>
-              <a:t>10/2/2013</a:t>
+              <a:t>10/3/2013</a:t>
             </a:fld>
             <a:endParaRPr lang="en-US"/>
           </a:p>
@@ -2151,7 +2152,7 @@
             <a:fld id="{465D789A-1220-4441-8676-44A034051BFD}" type="datetime1">
               <a:rPr lang="en-US" smtClean="0"/>
               <a:pPr/>
-              <a:t>10/2/2013</a:t>
+              <a:t>10/3/2013</a:t>
             </a:fld>
             <a:endParaRPr lang="en-US"/>
           </a:p>
@@ -2243,7 +2244,7 @@
             <a:fld id="{EF98A266-E364-4B5E-98DD-432668182E1E}" type="datetime1">
               <a:rPr lang="en-US" smtClean="0"/>
               <a:pPr/>
-              <a:t>10/2/2013</a:t>
+              <a:t>10/3/2013</a:t>
             </a:fld>
             <a:endParaRPr lang="en-US"/>
           </a:p>
@@ -2525,7 +2526,7 @@
             <a:fld id="{493F2040-9975-4642-A906-1DF87F8BE202}" type="datetime1">
               <a:rPr lang="en-US" smtClean="0"/>
               <a:pPr/>
-              <a:t>10/2/2013</a:t>
+              <a:t>10/3/2013</a:t>
             </a:fld>
             <a:endParaRPr lang="en-US"/>
           </a:p>
@@ -2826,7 +2827,7 @@
             <a:fld id="{51E52B4A-BA08-4841-AB08-A0D822ABC34D}" type="datetime1">
               <a:rPr lang="en-US" smtClean="0"/>
               <a:pPr/>
-              <a:t>10/2/2013</a:t>
+              <a:t>10/3/2013</a:t>
             </a:fld>
             <a:endParaRPr lang="en-US"/>
           </a:p>
@@ -3038,7 +3039,7 @@
             <a:fld id="{75D48070-6A81-47D0-9810-1540B9FEFF61}" type="datetime1">
               <a:rPr lang="en-US" smtClean="0"/>
               <a:pPr/>
-              <a:t>10/2/2013</a:t>
+              <a:t>10/3/2013</a:t>
             </a:fld>
             <a:endParaRPr lang="en-US"/>
           </a:p>
@@ -3630,7 +3631,7 @@
             </a:r>
             <a:r>
               <a:rPr lang="es-ES" dirty="0" smtClean="0"/>
-              <a:t>.                </a:t>
+              <a:t>                </a:t>
             </a:r>
             <a:endParaRPr lang="es-ES" sz="1200" dirty="0"/>
           </a:p>
@@ -3655,11 +3656,7 @@
           <a:p>
             <a:r>
               <a:rPr lang="es-ES" dirty="0" smtClean="0"/>
-              <a:t>Oscar Mesa</a:t>
-            </a:r>
-            <a:r>
-              <a:rPr lang="es-ES" dirty="0" smtClean="0"/>
-              <a:t>.</a:t>
+              <a:t>Oscar Mesa.</a:t>
             </a:r>
           </a:p>
           <a:p>
@@ -3700,20 +3697,20 @@
     </p:spTree>
     <p:extLst>
       <p:ext uri="{BB962C8B-B14F-4D97-AF65-F5344CB8AC3E}">
-        <p14:creationId xmlns="" xmlns:p14="http://schemas.microsoft.com/office/powerpoint/2010/main" val="84212580"/>
+        <p14:creationId xmlns:p14="http://schemas.microsoft.com/office/powerpoint/2010/main" val="84212580"/>
       </p:ext>
     </p:extLst>
   </p:cSld>
   <p:clrMapOvr>
     <a:masterClrMapping/>
   </p:clrMapOvr>
-  <mc:AlternateContent xmlns:mc="http://schemas.openxmlformats.org/markup-compatibility/2006">
-    <mc:Choice xmlns="" xmlns:p14="http://schemas.microsoft.com/office/powerpoint/2010/main" Requires="p14">
+  <mc:AlternateContent xmlns:mc="http://schemas.openxmlformats.org/markup-compatibility/2006" xmlns:p14="http://schemas.microsoft.com/office/powerpoint/2010/main">
+    <mc:Choice Requires="p14">
       <p:transition spd="med" p14:dur="700">
         <p:fade/>
       </p:transition>
     </mc:Choice>
-    <mc:Fallback>
+    <mc:Fallback xmlns="">
       <p:transition spd="med">
         <p:fade/>
       </p:transition>
@@ -3834,7 +3831,7 @@
           <a:blip r:embed="rId2">
             <a:extLst>
               <a:ext uri="{28A0092B-C50C-407E-A947-70E740481C1C}">
-                <a14:useLocalDpi xmlns="" xmlns:a14="http://schemas.microsoft.com/office/drawing/2010/main" val="0"/>
+                <a14:useLocalDpi xmlns:a14="http://schemas.microsoft.com/office/drawing/2010/main" val="0"/>
               </a:ext>
             </a:extLst>
           </a:blip>
@@ -3869,20 +3866,20 @@
     </p:spTree>
     <p:extLst>
       <p:ext uri="{BB962C8B-B14F-4D97-AF65-F5344CB8AC3E}">
-        <p14:creationId xmlns="" xmlns:p14="http://schemas.microsoft.com/office/powerpoint/2010/main" val="3613389559"/>
+        <p14:creationId xmlns:p14="http://schemas.microsoft.com/office/powerpoint/2010/main" val="3613389559"/>
       </p:ext>
     </p:extLst>
   </p:cSld>
   <p:clrMapOvr>
     <a:masterClrMapping/>
   </p:clrMapOvr>
-  <mc:AlternateContent xmlns:mc="http://schemas.openxmlformats.org/markup-compatibility/2006">
-    <mc:Choice xmlns="" xmlns:p14="http://schemas.microsoft.com/office/powerpoint/2010/main" Requires="p14">
+  <mc:AlternateContent xmlns:mc="http://schemas.openxmlformats.org/markup-compatibility/2006" xmlns:p14="http://schemas.microsoft.com/office/powerpoint/2010/main">
+    <mc:Choice Requires="p14">
       <p:transition spd="med" p14:dur="700">
         <p:fade/>
       </p:transition>
     </mc:Choice>
-    <mc:Fallback>
+    <mc:Fallback xmlns="">
       <p:transition spd="med">
         <p:fade/>
       </p:transition>
@@ -4082,20 +4079,20 @@
     </p:spTree>
     <p:extLst>
       <p:ext uri="{BB962C8B-B14F-4D97-AF65-F5344CB8AC3E}">
-        <p14:creationId xmlns="" xmlns:p14="http://schemas.microsoft.com/office/powerpoint/2010/main" val="51029955"/>
+        <p14:creationId xmlns:p14="http://schemas.microsoft.com/office/powerpoint/2010/main" val="51029955"/>
       </p:ext>
     </p:extLst>
   </p:cSld>
   <p:clrMapOvr>
     <a:masterClrMapping/>
   </p:clrMapOvr>
-  <mc:AlternateContent xmlns:mc="http://schemas.openxmlformats.org/markup-compatibility/2006">
-    <mc:Choice xmlns="" xmlns:p14="http://schemas.microsoft.com/office/powerpoint/2010/main" Requires="p14">
+  <mc:AlternateContent xmlns:mc="http://schemas.openxmlformats.org/markup-compatibility/2006" xmlns:p14="http://schemas.microsoft.com/office/powerpoint/2010/main">
+    <mc:Choice Requires="p14">
       <p:transition spd="med" p14:dur="700">
         <p:fade/>
       </p:transition>
     </mc:Choice>
-    <mc:Fallback>
+    <mc:Fallback xmlns="">
       <p:transition spd="med">
         <p:fade/>
       </p:transition>
@@ -4140,7 +4137,7 @@
           <a:blip r:embed="rId2" cstate="print">
             <a:extLst>
               <a:ext uri="{28A0092B-C50C-407E-A947-70E740481C1C}">
-                <a14:useLocalDpi xmlns="" xmlns:a14="http://schemas.microsoft.com/office/drawing/2010/main" val="0"/>
+                <a14:useLocalDpi xmlns:a14="http://schemas.microsoft.com/office/drawing/2010/main" val="0"/>
               </a:ext>
             </a:extLst>
           </a:blip>
@@ -4199,20 +4196,20 @@
     </p:spTree>
     <p:extLst>
       <p:ext uri="{BB962C8B-B14F-4D97-AF65-F5344CB8AC3E}">
-        <p14:creationId xmlns="" xmlns:p14="http://schemas.microsoft.com/office/powerpoint/2010/main" val="81837359"/>
+        <p14:creationId xmlns:p14="http://schemas.microsoft.com/office/powerpoint/2010/main" val="81837359"/>
       </p:ext>
     </p:extLst>
   </p:cSld>
   <p:clrMapOvr>
     <a:masterClrMapping/>
   </p:clrMapOvr>
-  <mc:AlternateContent xmlns:mc="http://schemas.openxmlformats.org/markup-compatibility/2006">
-    <mc:Choice xmlns="" xmlns:p14="http://schemas.microsoft.com/office/powerpoint/2010/main" Requires="p14">
+  <mc:AlternateContent xmlns:mc="http://schemas.openxmlformats.org/markup-compatibility/2006" xmlns:p14="http://schemas.microsoft.com/office/powerpoint/2010/main">
+    <mc:Choice Requires="p14">
       <p:transition spd="med" p14:dur="700">
         <p:fade/>
       </p:transition>
     </mc:Choice>
-    <mc:Fallback>
+    <mc:Fallback xmlns="">
       <p:transition spd="med">
         <p:fade/>
       </p:transition>
@@ -4305,20 +4302,20 @@
     </p:spTree>
     <p:extLst>
       <p:ext uri="{BB962C8B-B14F-4D97-AF65-F5344CB8AC3E}">
-        <p14:creationId xmlns="" xmlns:p14="http://schemas.microsoft.com/office/powerpoint/2010/main" val="1753873366"/>
+        <p14:creationId xmlns:p14="http://schemas.microsoft.com/office/powerpoint/2010/main" val="1753873366"/>
       </p:ext>
     </p:extLst>
   </p:cSld>
   <p:clrMapOvr>
     <a:masterClrMapping/>
   </p:clrMapOvr>
-  <mc:AlternateContent xmlns:mc="http://schemas.openxmlformats.org/markup-compatibility/2006">
-    <mc:Choice xmlns="" xmlns:p14="http://schemas.microsoft.com/office/powerpoint/2010/main" Requires="p14">
+  <mc:AlternateContent xmlns:mc="http://schemas.openxmlformats.org/markup-compatibility/2006" xmlns:p14="http://schemas.microsoft.com/office/powerpoint/2010/main">
+    <mc:Choice Requires="p14">
       <p:transition spd="med" p14:dur="700">
         <p:fade/>
       </p:transition>
     </mc:Choice>
-    <mc:Fallback>
+    <mc:Fallback xmlns="">
       <p:transition spd="med">
         <p:fade/>
       </p:transition>
@@ -4370,7 +4367,7 @@
           <a:p>
             <a:r>
               <a:rPr lang="es-ES" dirty="0" smtClean="0"/>
-              <a:t>Problema</a:t>
+              <a:t>Necesidad</a:t>
             </a:r>
             <a:endParaRPr lang="es-ES" dirty="0"/>
           </a:p>
@@ -4384,8 +4381,8 @@
         </p:nvSpPr>
         <p:spPr>
           <a:xfrm>
-            <a:off x="1105115" y="725802"/>
-            <a:ext cx="7389424" cy="3385542"/>
+            <a:off x="381885" y="725802"/>
+            <a:ext cx="8367426" cy="3139321"/>
           </a:xfrm>
           <a:prstGeom prst="rect">
             <a:avLst/>
@@ -4416,51 +4413,57 @@
               <a:buChar char="•"/>
             </a:pPr>
             <a:r>
-              <a:rPr lang="es-ES" sz="2800" dirty="0" smtClean="0"/>
-              <a:t>Poco interés por  parte del estudiante.</a:t>
-            </a:r>
-          </a:p>
-          <a:p>
-            <a:pPr marL="342900" indent="-342900">
-              <a:buFont typeface="Arial"/>
-              <a:buChar char="•"/>
-            </a:pPr>
-            <a:r>
-              <a:rPr lang="es-ES" sz="2800" dirty="0" smtClean="0"/>
-              <a:t>Poco uso de herramientas ofimáticas.</a:t>
-            </a:r>
-          </a:p>
-          <a:p>
-            <a:pPr marL="342900" indent="-342900">
-              <a:buFont typeface="Arial"/>
-              <a:buChar char="•"/>
-            </a:pPr>
-            <a:r>
-              <a:rPr lang="es-ES" sz="2800" dirty="0" smtClean="0"/>
-              <a:t>Baja interactividad. </a:t>
-            </a:r>
-          </a:p>
-          <a:p>
-            <a:pPr marL="342900" indent="-342900">
-              <a:buFont typeface="Arial"/>
-              <a:buChar char="•"/>
-            </a:pPr>
-            <a:r>
-              <a:rPr lang="es-ES" sz="2800" dirty="0" smtClean="0"/>
-              <a:t>Sistemas de gestión acorde a la necesidad de la institución y los módulos.</a:t>
-            </a:r>
-          </a:p>
-          <a:p>
-            <a:pPr marL="342900" indent="-342900">
-              <a:buFont typeface="Arial"/>
-              <a:buChar char="•"/>
-            </a:pPr>
-            <a:r>
-              <a:rPr lang="es-ES" sz="2800" dirty="0" smtClean="0"/>
-              <a:t>Falta de comunicación entre el estudiante y el docente.</a:t>
-            </a:r>
-            <a:endParaRPr lang="es-ES" sz="2800" dirty="0"/>
-          </a:p>
+              <a:rPr lang="es-ES" sz="3600" dirty="0" smtClean="0"/>
+              <a:t>Se </a:t>
+            </a:r>
+            <a:r>
+              <a:rPr lang="es-ES_tradnl" sz="3600" dirty="0" smtClean="0"/>
+              <a:t>centra </a:t>
+            </a:r>
+            <a:r>
+              <a:rPr lang="es-ES_tradnl" sz="3600" dirty="0"/>
+              <a:t>en la creación de un ambiente genérico y común que le permita a al estudiante complementar y poder extender sus conocimientos </a:t>
+            </a:r>
+            <a:r>
+              <a:rPr lang="es-ES_tradnl" sz="3600" dirty="0" smtClean="0"/>
+              <a:t>en </a:t>
+            </a:r>
+            <a:r>
+              <a:rPr lang="es-ES_tradnl" sz="3600" smtClean="0"/>
+              <a:t>el transcurso de </a:t>
+            </a:r>
+            <a:r>
+              <a:rPr lang="es-ES_tradnl" sz="3600" dirty="0"/>
+              <a:t>su ciclo educativo. </a:t>
+            </a:r>
+            <a:endParaRPr lang="es-ES" dirty="0"/>
+          </a:p>
+          <a:p>
+            <a:endParaRPr lang="es-ES" dirty="0"/>
+          </a:p>
+        </p:txBody>
+      </p:sp>
+      <p:sp>
+        <p:nvSpPr>
+          <p:cNvPr id="3" name="CuadroTexto 2"/>
+          <p:cNvSpPr txBox="1"/>
+          <p:nvPr/>
+        </p:nvSpPr>
+        <p:spPr>
+          <a:xfrm>
+            <a:off x="7735803" y="4915656"/>
+            <a:ext cx="184666" cy="369332"/>
+          </a:xfrm>
+          <a:prstGeom prst="rect">
+            <a:avLst/>
+          </a:prstGeom>
+          <a:noFill/>
+        </p:spPr>
+        <p:txBody>
+          <a:bodyPr wrap="none" rtlCol="0">
+            <a:spAutoFit/>
+          </a:bodyPr>
+          <a:lstStyle/>
           <a:p>
             <a:endParaRPr lang="es-ES" dirty="0"/>
           </a:p>
@@ -4469,20 +4472,20 @@
     </p:spTree>
     <p:extLst>
       <p:ext uri="{BB962C8B-B14F-4D97-AF65-F5344CB8AC3E}">
-        <p14:creationId xmlns="" xmlns:p14="http://schemas.microsoft.com/office/powerpoint/2010/main" val="1126583896"/>
+        <p14:creationId xmlns:p14="http://schemas.microsoft.com/office/powerpoint/2010/main" val="2618284471"/>
       </p:ext>
     </p:extLst>
   </p:cSld>
   <p:clrMapOvr>
     <a:masterClrMapping/>
   </p:clrMapOvr>
-  <mc:AlternateContent xmlns:mc="http://schemas.openxmlformats.org/markup-compatibility/2006">
-    <mc:Choice xmlns="" xmlns:p14="http://schemas.microsoft.com/office/powerpoint/2010/main" Requires="p14">
+  <mc:AlternateContent xmlns:mc="http://schemas.openxmlformats.org/markup-compatibility/2006" xmlns:p14="http://schemas.microsoft.com/office/powerpoint/2010/main">
+    <mc:Choice Requires="p14">
       <p:transition spd="med" p14:dur="700">
         <p:fade/>
       </p:transition>
     </mc:Choice>
-    <mc:Fallback>
+    <mc:Fallback xmlns="">
       <p:transition spd="med">
         <p:fade/>
       </p:transition>
@@ -4534,7 +4537,7 @@
           <a:p>
             <a:r>
               <a:rPr lang="es-ES" dirty="0" smtClean="0"/>
-              <a:t>Necesidad</a:t>
+              <a:t>Problema</a:t>
             </a:r>
             <a:endParaRPr lang="es-ES" dirty="0"/>
           </a:p>
@@ -4542,100 +4545,61 @@
       </p:sp>
       <p:sp>
         <p:nvSpPr>
-          <p:cNvPr id="6" name="CuadroTexto 5"/>
-          <p:cNvSpPr txBox="1"/>
+          <p:cNvPr id="3" name="2 Triángulo isósceles"/>
+          <p:cNvSpPr/>
           <p:nvPr/>
         </p:nvSpPr>
         <p:spPr>
-          <a:xfrm>
-            <a:off x="381885" y="725802"/>
-            <a:ext cx="8367426" cy="2862322"/>
-          </a:xfrm>
-          <a:prstGeom prst="rect">
+          <a:xfrm rot="5400000">
+            <a:off x="3843130" y="2054087"/>
+            <a:ext cx="1510748" cy="1378226"/>
+          </a:xfrm>
+          <a:prstGeom prst="triangle">
             <a:avLst/>
           </a:prstGeom>
         </p:spPr>
         <p:style>
-          <a:lnRef idx="3">
-            <a:schemeClr val="lt1"/>
+          <a:lnRef idx="2">
+            <a:schemeClr val="accent1">
+              <a:shade val="50000"/>
+            </a:schemeClr>
           </a:lnRef>
           <a:fillRef idx="1">
-            <a:schemeClr val="accent5"/>
+            <a:schemeClr val="accent1"/>
           </a:fillRef>
-          <a:effectRef idx="1">
-            <a:schemeClr val="accent5"/>
+          <a:effectRef idx="0">
+            <a:schemeClr val="accent1"/>
           </a:effectRef>
           <a:fontRef idx="minor">
             <a:schemeClr val="lt1"/>
           </a:fontRef>
         </p:style>
         <p:txBody>
-          <a:bodyPr wrap="square" rtlCol="0">
-            <a:spAutoFit/>
-          </a:bodyPr>
-          <a:lstStyle/>
-          <a:p>
-            <a:pPr marL="342900" indent="-342900">
-              <a:buFont typeface="Arial"/>
-              <a:buChar char="•"/>
-            </a:pPr>
-            <a:r>
-              <a:rPr lang="es-ES" sz="3600" dirty="0" smtClean="0"/>
-              <a:t>Desarrollar un sistema de información, mediante el cual se gestionen los contenidos de los módulos y sirva de apoyo a estudiantes y docentes.</a:t>
-            </a:r>
-            <a:endParaRPr lang="es-ES" sz="3600" dirty="0"/>
-          </a:p>
-          <a:p>
-            <a:endParaRPr lang="es-ES" dirty="0"/>
-          </a:p>
-          <a:p>
-            <a:endParaRPr lang="es-ES" dirty="0"/>
-          </a:p>
-        </p:txBody>
-      </p:sp>
-      <p:sp>
-        <p:nvSpPr>
-          <p:cNvPr id="3" name="CuadroTexto 2"/>
-          <p:cNvSpPr txBox="1"/>
-          <p:nvPr/>
-        </p:nvSpPr>
-        <p:spPr>
-          <a:xfrm>
-            <a:off x="7735803" y="4915656"/>
-            <a:ext cx="184666" cy="369332"/>
-          </a:xfrm>
-          <a:prstGeom prst="rect">
-            <a:avLst/>
-          </a:prstGeom>
-          <a:noFill/>
-        </p:spPr>
-        <p:txBody>
-          <a:bodyPr wrap="none" rtlCol="0">
-            <a:spAutoFit/>
-          </a:bodyPr>
-          <a:lstStyle/>
-          <a:p>
-            <a:endParaRPr lang="es-ES" dirty="0"/>
+          <a:bodyPr rtlCol="0" anchor="ctr"/>
+          <a:lstStyle/>
+          <a:p>
+            <a:pPr algn="ctr"/>
+            <a:endParaRPr lang="es-ES"/>
           </a:p>
         </p:txBody>
       </p:sp>
     </p:spTree>
     <p:extLst>
       <p:ext uri="{BB962C8B-B14F-4D97-AF65-F5344CB8AC3E}">
-        <p14:creationId xmlns="" xmlns:p14="http://schemas.microsoft.com/office/powerpoint/2010/main" val="2618284471"/>
+        <p14:creationId xmlns:p14="http://schemas.microsoft.com/office/powerpoint/2010/main" val="1126583896"/>
       </p:ext>
     </p:extLst>
   </p:cSld>
   <p:clrMapOvr>
     <a:masterClrMapping/>
   </p:clrMapOvr>
-  <mc:AlternateContent xmlns:mc="http://schemas.openxmlformats.org/markup-compatibility/2006">
-    <mc:Choice xmlns="" xmlns:p14="http://schemas.microsoft.com/office/powerpoint/2010/main" Requires="p14">
+  <mc:AlternateContent xmlns:mc="http://schemas.openxmlformats.org/markup-compatibility/2006" xmlns:p14="http://schemas.microsoft.com/office/powerpoint/2010/main">
+    <mc:Choice Requires="p14">
       <p:transition spd="med" p14:dur="700">
         <p:fade/>
       </p:transition>
     </mc:Choice>
-    <mc:Fallback>
+    <mc:Fallback xmlns="">
       <p:transition spd="med">
         <p:fade/>
       </p:transition>
@@ -4702,7 +4666,7 @@
         <p:spPr>
           <a:xfrm>
             <a:off x="1105115" y="725802"/>
-            <a:ext cx="7191493" cy="1815882"/>
+            <a:ext cx="7191493" cy="3970318"/>
           </a:xfrm>
           <a:prstGeom prst="rect">
             <a:avLst/>
@@ -4728,23 +4692,26 @@
           </a:bodyPr>
           <a:lstStyle/>
           <a:p>
-            <a:pPr marL="285750" indent="-285750">
-              <a:buFont typeface="Arial"/>
-              <a:buChar char="•"/>
-            </a:pPr>
-            <a:r>
-              <a:rPr lang="es-ES" sz="2800" dirty="0" smtClean="0"/>
-              <a:t>EL sistema puede ser adoptado por cualquier curso.</a:t>
-            </a:r>
-          </a:p>
-          <a:p>
-            <a:pPr marL="285750" indent="-285750">
-              <a:buFont typeface="Arial"/>
-              <a:buChar char="•"/>
-            </a:pPr>
-            <a:r>
-              <a:rPr lang="es-ES" sz="2800" dirty="0" smtClean="0"/>
-              <a:t>Esta plataforma da prioridad a los módulos de matemáticas.</a:t>
+            <a:r>
+              <a:rPr lang="es-ES_tradnl" sz="2800" dirty="0" smtClean="0"/>
+              <a:t>Este sistema esta enfocado en gran parte </a:t>
+            </a:r>
+            <a:r>
+              <a:rPr lang="es-ES_tradnl" sz="2800" dirty="0"/>
+              <a:t>a cualquier modulo que tenga un fin educativo y que se rija bajo los parámetros de la educación convencional que se utiliza en nuestro país</a:t>
+            </a:r>
+            <a:r>
+              <a:rPr lang="es-ES_tradnl" sz="2800" dirty="0" smtClean="0"/>
+              <a:t>.</a:t>
+            </a:r>
+          </a:p>
+          <a:p>
+            <a:endParaRPr lang="es-ES_tradnl" sz="2800" dirty="0"/>
+          </a:p>
+          <a:p>
+            <a:r>
+              <a:rPr lang="es-ES_tradnl" sz="2800" dirty="0" smtClean="0"/>
+              <a:t>El proyecto contara estrictamente con los siguientes módulos: usuarios, perfiles, materias, imágenes, videos, exámenes, chat, ejercicios, tablero virtual.</a:t>
             </a:r>
           </a:p>
         </p:txBody>
@@ -4804,20 +4771,20 @@
     </p:spTree>
     <p:extLst>
       <p:ext uri="{BB962C8B-B14F-4D97-AF65-F5344CB8AC3E}">
-        <p14:creationId xmlns="" xmlns:p14="http://schemas.microsoft.com/office/powerpoint/2010/main" val="1152204458"/>
+        <p14:creationId xmlns:p14="http://schemas.microsoft.com/office/powerpoint/2010/main" val="1152204458"/>
       </p:ext>
     </p:extLst>
   </p:cSld>
   <p:clrMapOvr>
     <a:masterClrMapping/>
   </p:clrMapOvr>
-  <mc:AlternateContent xmlns:mc="http://schemas.openxmlformats.org/markup-compatibility/2006">
-    <mc:Choice xmlns="" xmlns:p14="http://schemas.microsoft.com/office/powerpoint/2010/main" Requires="p14">
+  <mc:AlternateContent xmlns:mc="http://schemas.openxmlformats.org/markup-compatibility/2006" xmlns:p14="http://schemas.microsoft.com/office/powerpoint/2010/main">
+    <mc:Choice Requires="p14">
       <p:transition spd="med" p14:dur="700">
         <p:fade/>
       </p:transition>
     </mc:Choice>
-    <mc:Fallback>
+    <mc:Fallback xmlns="">
       <p:transition spd="med">
         <p:fade/>
       </p:transition>
@@ -4860,7 +4827,12 @@
             <p:ph type="title"/>
           </p:nvPr>
         </p:nvSpPr>
-        <p:spPr/>
+        <p:spPr>
+          <a:xfrm>
+            <a:off x="762000" y="5062330"/>
+            <a:ext cx="6781800" cy="1109870"/>
+          </a:xfrm>
+        </p:spPr>
         <p:txBody>
           <a:bodyPr>
             <a:normAutofit/>
@@ -4877,89 +4849,28 @@
       </p:sp>
       <p:sp>
         <p:nvSpPr>
-          <p:cNvPr id="8" name="CuadroTexto 7"/>
-          <p:cNvSpPr txBox="1"/>
+          <p:cNvPr id="17" name="16 Rectángulo"/>
+          <p:cNvSpPr/>
           <p:nvPr/>
         </p:nvSpPr>
         <p:spPr>
           <a:xfrm>
-            <a:off x="907184" y="4123873"/>
-            <a:ext cx="184666" cy="369332"/>
+            <a:off x="4889437" y="1775785"/>
+            <a:ext cx="2654363" cy="569844"/>
           </a:xfrm>
           <a:prstGeom prst="rect">
             <a:avLst/>
           </a:prstGeom>
-          <a:noFill/>
-        </p:spPr>
-        <p:txBody>
-          <a:bodyPr wrap="none" rtlCol="0">
-            <a:spAutoFit/>
-          </a:bodyPr>
-          <a:lstStyle/>
-          <a:p>
-            <a:endParaRPr lang="es-ES" dirty="0"/>
-          </a:p>
-        </p:txBody>
-      </p:sp>
-      <p:sp>
-        <p:nvSpPr>
-          <p:cNvPr id="9" name="CuadroTexto 8"/>
-          <p:cNvSpPr txBox="1"/>
-          <p:nvPr/>
-        </p:nvSpPr>
-        <p:spPr>
-          <a:xfrm>
-            <a:off x="709253" y="2672269"/>
-            <a:ext cx="184666" cy="369332"/>
-          </a:xfrm>
-          <a:prstGeom prst="rect">
-            <a:avLst/>
-          </a:prstGeom>
-          <a:noFill/>
-        </p:spPr>
-        <p:txBody>
-          <a:bodyPr wrap="none" rtlCol="0">
-            <a:spAutoFit/>
-          </a:bodyPr>
-          <a:lstStyle/>
-          <a:p>
-            <a:endParaRPr lang="es-ES" dirty="0"/>
-          </a:p>
-        </p:txBody>
-      </p:sp>
-      <p:sp>
-        <p:nvSpPr>
-          <p:cNvPr id="3" name="Elipse 2">
-            <a:hlinkClick r:id="rId2" action="ppaction://hlinkfile"/>
-          </p:cNvPr>
-          <p:cNvSpPr/>
-          <p:nvPr/>
-        </p:nvSpPr>
-        <p:spPr>
-          <a:xfrm>
-            <a:off x="3510308" y="1773150"/>
-            <a:ext cx="2293167" cy="1989293"/>
-          </a:xfrm>
-          <a:prstGeom prst="ellipse">
-            <a:avLst/>
-          </a:prstGeom>
-          <a:effectLst>
-            <a:outerShdw blurRad="50800" dist="38100" dir="13500000" algn="br" rotWithShape="0">
-              <a:prstClr val="black">
-                <a:alpha val="40000"/>
-              </a:prstClr>
-            </a:outerShdw>
-          </a:effectLst>
         </p:spPr>
         <p:style>
-          <a:lnRef idx="0">
-            <a:schemeClr val="accent5"/>
+          <a:lnRef idx="3">
+            <a:schemeClr val="lt1"/>
           </a:lnRef>
-          <a:fillRef idx="3">
-            <a:schemeClr val="accent5"/>
+          <a:fillRef idx="1">
+            <a:schemeClr val="accent1"/>
           </a:fillRef>
-          <a:effectRef idx="3">
-            <a:schemeClr val="accent5"/>
+          <a:effectRef idx="1">
+            <a:schemeClr val="accent1"/>
           </a:effectRef>
           <a:fontRef idx="minor">
             <a:schemeClr val="lt1"/>
@@ -4971,8 +4882,372 @@
           <a:p>
             <a:pPr algn="ctr"/>
             <a:r>
-              <a:rPr lang="es-ES" dirty="0" smtClean="0"/>
-              <a:t>ABRIR</a:t>
+              <a:rPr lang="es-ES_tradnl" dirty="0"/>
+              <a:t>Administrar  </a:t>
+            </a:r>
+            <a:r>
+              <a:rPr lang="es-ES_tradnl" dirty="0" smtClean="0"/>
+              <a:t>ejercicios</a:t>
+            </a:r>
+            <a:endParaRPr lang="es-ES" dirty="0"/>
+          </a:p>
+        </p:txBody>
+      </p:sp>
+      <p:sp>
+        <p:nvSpPr>
+          <p:cNvPr id="18" name="17 Rectángulo"/>
+          <p:cNvSpPr/>
+          <p:nvPr/>
+        </p:nvSpPr>
+        <p:spPr>
+          <a:xfrm>
+            <a:off x="4889437" y="2544637"/>
+            <a:ext cx="2654363" cy="569844"/>
+          </a:xfrm>
+          <a:prstGeom prst="rect">
+            <a:avLst/>
+          </a:prstGeom>
+        </p:spPr>
+        <p:style>
+          <a:lnRef idx="3">
+            <a:schemeClr val="lt1"/>
+          </a:lnRef>
+          <a:fillRef idx="1">
+            <a:schemeClr val="accent1"/>
+          </a:fillRef>
+          <a:effectRef idx="1">
+            <a:schemeClr val="accent1"/>
+          </a:effectRef>
+          <a:fontRef idx="minor">
+            <a:schemeClr val="lt1"/>
+          </a:fontRef>
+        </p:style>
+        <p:txBody>
+          <a:bodyPr rtlCol="0" anchor="ctr"/>
+          <a:lstStyle/>
+          <a:p>
+            <a:pPr algn="ctr"/>
+            <a:r>
+              <a:rPr lang="es-ES_tradnl" dirty="0"/>
+              <a:t>Administrar  </a:t>
+            </a:r>
+            <a:r>
+              <a:rPr lang="es-ES_tradnl" dirty="0" smtClean="0"/>
+              <a:t>sonidos</a:t>
+            </a:r>
+            <a:endParaRPr lang="es-ES" dirty="0"/>
+          </a:p>
+        </p:txBody>
+      </p:sp>
+      <p:sp>
+        <p:nvSpPr>
+          <p:cNvPr id="19" name="18 Rectángulo"/>
+          <p:cNvSpPr/>
+          <p:nvPr/>
+        </p:nvSpPr>
+        <p:spPr>
+          <a:xfrm>
+            <a:off x="4889437" y="4096497"/>
+            <a:ext cx="2654363" cy="569844"/>
+          </a:xfrm>
+          <a:prstGeom prst="rect">
+            <a:avLst/>
+          </a:prstGeom>
+        </p:spPr>
+        <p:style>
+          <a:lnRef idx="3">
+            <a:schemeClr val="lt1"/>
+          </a:lnRef>
+          <a:fillRef idx="1">
+            <a:schemeClr val="accent1"/>
+          </a:fillRef>
+          <a:effectRef idx="1">
+            <a:schemeClr val="accent1"/>
+          </a:effectRef>
+          <a:fontRef idx="minor">
+            <a:schemeClr val="lt1"/>
+          </a:fontRef>
+        </p:style>
+        <p:txBody>
+          <a:bodyPr rtlCol="0" anchor="ctr"/>
+          <a:lstStyle/>
+          <a:p>
+            <a:pPr algn="ctr"/>
+            <a:r>
+              <a:rPr lang="es-ES_tradnl" dirty="0"/>
+              <a:t>Administrar  </a:t>
+            </a:r>
+            <a:r>
+              <a:rPr lang="es-ES_tradnl" dirty="0" smtClean="0"/>
+              <a:t>videos</a:t>
+            </a:r>
+            <a:endParaRPr lang="es-ES" dirty="0"/>
+          </a:p>
+        </p:txBody>
+      </p:sp>
+      <p:sp>
+        <p:nvSpPr>
+          <p:cNvPr id="20" name="19 Rectángulo"/>
+          <p:cNvSpPr/>
+          <p:nvPr/>
+        </p:nvSpPr>
+        <p:spPr>
+          <a:xfrm>
+            <a:off x="4889437" y="3341987"/>
+            <a:ext cx="2654363" cy="569844"/>
+          </a:xfrm>
+          <a:prstGeom prst="rect">
+            <a:avLst/>
+          </a:prstGeom>
+        </p:spPr>
+        <p:style>
+          <a:lnRef idx="3">
+            <a:schemeClr val="lt1"/>
+          </a:lnRef>
+          <a:fillRef idx="1">
+            <a:schemeClr val="accent1"/>
+          </a:fillRef>
+          <a:effectRef idx="1">
+            <a:schemeClr val="accent1"/>
+          </a:effectRef>
+          <a:fontRef idx="minor">
+            <a:schemeClr val="lt1"/>
+          </a:fontRef>
+        </p:style>
+        <p:txBody>
+          <a:bodyPr rtlCol="0" anchor="ctr"/>
+          <a:lstStyle/>
+          <a:p>
+            <a:pPr algn="ctr"/>
+            <a:r>
+              <a:rPr lang="es-ES_tradnl" dirty="0"/>
+              <a:t>Administrar  </a:t>
+            </a:r>
+            <a:r>
+              <a:rPr lang="es-ES_tradnl" dirty="0" smtClean="0"/>
+              <a:t>imágenes</a:t>
+            </a:r>
+            <a:endParaRPr lang="es-ES" dirty="0"/>
+          </a:p>
+        </p:txBody>
+      </p:sp>
+      <p:sp>
+        <p:nvSpPr>
+          <p:cNvPr id="21" name="20 Rectángulo"/>
+          <p:cNvSpPr/>
+          <p:nvPr/>
+        </p:nvSpPr>
+        <p:spPr>
+          <a:xfrm>
+            <a:off x="1503506" y="1775785"/>
+            <a:ext cx="2710685" cy="569844"/>
+          </a:xfrm>
+          <a:prstGeom prst="rect">
+            <a:avLst/>
+          </a:prstGeom>
+        </p:spPr>
+        <p:style>
+          <a:lnRef idx="3">
+            <a:schemeClr val="lt1"/>
+          </a:lnRef>
+          <a:fillRef idx="1">
+            <a:schemeClr val="accent1"/>
+          </a:fillRef>
+          <a:effectRef idx="1">
+            <a:schemeClr val="accent1"/>
+          </a:effectRef>
+          <a:fontRef idx="minor">
+            <a:schemeClr val="lt1"/>
+          </a:fontRef>
+        </p:style>
+        <p:txBody>
+          <a:bodyPr rtlCol="0" anchor="ctr"/>
+          <a:lstStyle/>
+          <a:p>
+            <a:pPr algn="ctr"/>
+            <a:r>
+              <a:rPr lang="es-ES_tradnl" dirty="0"/>
+              <a:t>Administrar  </a:t>
+            </a:r>
+            <a:r>
+              <a:rPr lang="es-ES_tradnl" dirty="0" smtClean="0"/>
+              <a:t>cursos</a:t>
+            </a:r>
+            <a:endParaRPr lang="es-ES" dirty="0"/>
+          </a:p>
+        </p:txBody>
+      </p:sp>
+      <p:sp>
+        <p:nvSpPr>
+          <p:cNvPr id="22" name="21 Rectángulo"/>
+          <p:cNvSpPr/>
+          <p:nvPr/>
+        </p:nvSpPr>
+        <p:spPr>
+          <a:xfrm>
+            <a:off x="1503506" y="2544637"/>
+            <a:ext cx="2710685" cy="569844"/>
+          </a:xfrm>
+          <a:prstGeom prst="rect">
+            <a:avLst/>
+          </a:prstGeom>
+        </p:spPr>
+        <p:style>
+          <a:lnRef idx="3">
+            <a:schemeClr val="lt1"/>
+          </a:lnRef>
+          <a:fillRef idx="1">
+            <a:schemeClr val="accent1"/>
+          </a:fillRef>
+          <a:effectRef idx="1">
+            <a:schemeClr val="accent1"/>
+          </a:effectRef>
+          <a:fontRef idx="minor">
+            <a:schemeClr val="lt1"/>
+          </a:fontRef>
+        </p:style>
+        <p:txBody>
+          <a:bodyPr rtlCol="0" anchor="ctr"/>
+          <a:lstStyle/>
+          <a:p>
+            <a:pPr algn="ctr"/>
+            <a:r>
+              <a:rPr lang="es-ES_tradnl" dirty="0"/>
+              <a:t>Administrar  </a:t>
+            </a:r>
+            <a:r>
+              <a:rPr lang="es-ES_tradnl" dirty="0" smtClean="0"/>
+              <a:t>contenidos</a:t>
+            </a:r>
+            <a:endParaRPr lang="es-ES" dirty="0"/>
+          </a:p>
+        </p:txBody>
+      </p:sp>
+      <p:sp>
+        <p:nvSpPr>
+          <p:cNvPr id="23" name="22 Rectángulo"/>
+          <p:cNvSpPr/>
+          <p:nvPr/>
+        </p:nvSpPr>
+        <p:spPr>
+          <a:xfrm>
+            <a:off x="1503506" y="4096497"/>
+            <a:ext cx="2710685" cy="569844"/>
+          </a:xfrm>
+          <a:prstGeom prst="rect">
+            <a:avLst/>
+          </a:prstGeom>
+        </p:spPr>
+        <p:style>
+          <a:lnRef idx="3">
+            <a:schemeClr val="lt1"/>
+          </a:lnRef>
+          <a:fillRef idx="1">
+            <a:schemeClr val="accent1"/>
+          </a:fillRef>
+          <a:effectRef idx="1">
+            <a:schemeClr val="accent1"/>
+          </a:effectRef>
+          <a:fontRef idx="minor">
+            <a:schemeClr val="lt1"/>
+          </a:fontRef>
+        </p:style>
+        <p:txBody>
+          <a:bodyPr rtlCol="0" anchor="ctr"/>
+          <a:lstStyle/>
+          <a:p>
+            <a:pPr algn="ctr"/>
+            <a:r>
+              <a:rPr lang="es-ES_tradnl" dirty="0"/>
+              <a:t>Administrar  </a:t>
+            </a:r>
+            <a:r>
+              <a:rPr lang="es-ES_tradnl" dirty="0" smtClean="0"/>
+              <a:t>evaluaciones</a:t>
+            </a:r>
+            <a:endParaRPr lang="es-ES" dirty="0"/>
+          </a:p>
+        </p:txBody>
+      </p:sp>
+      <p:sp>
+        <p:nvSpPr>
+          <p:cNvPr id="24" name="23 Rectángulo"/>
+          <p:cNvSpPr/>
+          <p:nvPr/>
+        </p:nvSpPr>
+        <p:spPr>
+          <a:xfrm>
+            <a:off x="1503506" y="3341987"/>
+            <a:ext cx="2710685" cy="569844"/>
+          </a:xfrm>
+          <a:prstGeom prst="rect">
+            <a:avLst/>
+          </a:prstGeom>
+        </p:spPr>
+        <p:style>
+          <a:lnRef idx="3">
+            <a:schemeClr val="lt1"/>
+          </a:lnRef>
+          <a:fillRef idx="1">
+            <a:schemeClr val="accent1"/>
+          </a:fillRef>
+          <a:effectRef idx="1">
+            <a:schemeClr val="accent1"/>
+          </a:effectRef>
+          <a:fontRef idx="minor">
+            <a:schemeClr val="lt1"/>
+          </a:fontRef>
+        </p:style>
+        <p:txBody>
+          <a:bodyPr rtlCol="0" anchor="ctr"/>
+          <a:lstStyle/>
+          <a:p>
+            <a:pPr algn="ctr"/>
+            <a:r>
+              <a:rPr lang="es-ES_tradnl" dirty="0" smtClean="0"/>
+              <a:t>Administrar talleres</a:t>
+            </a:r>
+            <a:endParaRPr lang="es-ES" dirty="0"/>
+          </a:p>
+        </p:txBody>
+      </p:sp>
+      <p:sp>
+        <p:nvSpPr>
+          <p:cNvPr id="25" name="24 Rectángulo"/>
+          <p:cNvSpPr/>
+          <p:nvPr/>
+        </p:nvSpPr>
+        <p:spPr>
+          <a:xfrm>
+            <a:off x="3140149" y="881264"/>
+            <a:ext cx="2690808" cy="569844"/>
+          </a:xfrm>
+          <a:prstGeom prst="rect">
+            <a:avLst/>
+          </a:prstGeom>
+        </p:spPr>
+        <p:style>
+          <a:lnRef idx="3">
+            <a:schemeClr val="lt1"/>
+          </a:lnRef>
+          <a:fillRef idx="1">
+            <a:schemeClr val="accent1"/>
+          </a:fillRef>
+          <a:effectRef idx="1">
+            <a:schemeClr val="accent1"/>
+          </a:effectRef>
+          <a:fontRef idx="minor">
+            <a:schemeClr val="lt1"/>
+          </a:fontRef>
+        </p:style>
+        <p:txBody>
+          <a:bodyPr rtlCol="0" anchor="ctr"/>
+          <a:lstStyle/>
+          <a:p>
+            <a:pPr algn="ctr"/>
+            <a:r>
+              <a:rPr lang="es-ES_tradnl" dirty="0"/>
+              <a:t>Administrar  usuarios</a:t>
             </a:r>
             <a:endParaRPr lang="es-ES" dirty="0"/>
           </a:p>
@@ -4981,20 +5256,20 @@
     </p:spTree>
     <p:extLst>
       <p:ext uri="{BB962C8B-B14F-4D97-AF65-F5344CB8AC3E}">
-        <p14:creationId xmlns="" xmlns:p14="http://schemas.microsoft.com/office/powerpoint/2010/main" val="4220489925"/>
+        <p14:creationId xmlns:p14="http://schemas.microsoft.com/office/powerpoint/2010/main" val="4220489925"/>
       </p:ext>
     </p:extLst>
   </p:cSld>
   <p:clrMapOvr>
     <a:masterClrMapping/>
   </p:clrMapOvr>
-  <mc:AlternateContent xmlns:mc="http://schemas.openxmlformats.org/markup-compatibility/2006">
-    <mc:Choice xmlns="" xmlns:p14="http://schemas.microsoft.com/office/powerpoint/2010/main" Requires="p14">
+  <mc:AlternateContent xmlns:mc="http://schemas.openxmlformats.org/markup-compatibility/2006" xmlns:p14="http://schemas.microsoft.com/office/powerpoint/2010/main">
+    <mc:Choice Requires="p14">
       <p:transition spd="med" p14:dur="700">
         <p:fade/>
       </p:transition>
     </mc:Choice>
-    <mc:Fallback>
+    <mc:Fallback xmlns="">
       <p:transition spd="med">
         <p:fade/>
       </p:transition>
@@ -5037,16 +5312,25 @@
             <p:ph type="title"/>
           </p:nvPr>
         </p:nvSpPr>
-        <p:spPr/>
+        <p:spPr>
+          <a:xfrm>
+            <a:off x="762000" y="4956312"/>
+            <a:ext cx="6781800" cy="1215887"/>
+          </a:xfrm>
+        </p:spPr>
         <p:txBody>
           <a:bodyPr>
-            <a:normAutofit fontScale="90000"/>
+            <a:normAutofit/>
           </a:bodyPr>
           <a:lstStyle/>
           <a:p>
             <a:r>
               <a:rPr lang="es-ES" dirty="0" smtClean="0"/>
-              <a:t>Diagrama de despliegue</a:t>
+              <a:t>Diagrama </a:t>
+            </a:r>
+            <a:r>
+              <a:rPr lang="es-ES" dirty="0" smtClean="0"/>
+              <a:t>casos de uso</a:t>
             </a:r>
             <a:endParaRPr lang="es-ES" dirty="0"/>
           </a:p>
@@ -5106,57 +5390,66 @@
       </p:sp>
       <p:pic>
         <p:nvPicPr>
-          <p:cNvPr id="7" name="Imagen 6" descr="Screen shot 2013-06-15 at 5.18.03 AM.png"/>
+          <p:cNvPr id="1026" name="Picture 2" descr="\\10.100.3.250\PoliAuLink\archivos\diagramas\Casos de uso\General\General.png"/>
           <p:cNvPicPr>
-            <a:picLocks noChangeAspect="1"/>
+            <a:picLocks noChangeAspect="1" noChangeArrowheads="1"/>
           </p:cNvPicPr>
           <p:nvPr/>
         </p:nvPicPr>
         <p:blipFill>
-          <a:blip r:embed="rId2">
+          <a:blip r:embed="rId2" cstate="email">
             <a:extLst>
               <a:ext uri="{28A0092B-C50C-407E-A947-70E740481C1C}">
-                <a14:useLocalDpi xmlns="" xmlns:a14="http://schemas.microsoft.com/office/drawing/2010/main" val="0"/>
+                <a14:useLocalDpi xmlns:a14="http://schemas.microsoft.com/office/drawing/2010/main" val="0"/>
               </a:ext>
             </a:extLst>
           </a:blip>
+          <a:srcRect/>
           <a:stretch>
             <a:fillRect/>
           </a:stretch>
         </p:blipFill>
-        <p:spPr>
-          <a:xfrm>
-            <a:off x="0" y="705646"/>
-            <a:ext cx="9144000" cy="4594396"/>
+        <p:spPr bwMode="auto">
+          <a:xfrm>
+            <a:off x="907184" y="450950"/>
+            <a:ext cx="7308744" cy="4864977"/>
           </a:xfrm>
           <a:prstGeom prst="rect">
             <a:avLst/>
           </a:prstGeom>
-          <a:ln>
-            <a:noFill/>
-          </a:ln>
-          <a:effectLst>
-            <a:softEdge rad="112500"/>
-          </a:effectLst>
-        </p:spPr>
+        </p:spPr>
+        <p:style>
+          <a:lnRef idx="3">
+            <a:schemeClr val="lt1"/>
+          </a:lnRef>
+          <a:fillRef idx="1">
+            <a:schemeClr val="accent1"/>
+          </a:fillRef>
+          <a:effectRef idx="1">
+            <a:schemeClr val="accent1"/>
+          </a:effectRef>
+          <a:fontRef idx="minor">
+            <a:schemeClr val="lt1"/>
+          </a:fontRef>
+        </p:style>
       </p:pic>
     </p:spTree>
     <p:extLst>
       <p:ext uri="{BB962C8B-B14F-4D97-AF65-F5344CB8AC3E}">
-        <p14:creationId xmlns="" xmlns:p14="http://schemas.microsoft.com/office/powerpoint/2010/main" val="3759127632"/>
+        <p14:creationId xmlns:p14="http://schemas.microsoft.com/office/powerpoint/2010/main" val="3759127632"/>
       </p:ext>
     </p:extLst>
   </p:cSld>
   <p:clrMapOvr>
     <a:masterClrMapping/>
   </p:clrMapOvr>
-  <mc:AlternateContent xmlns:mc="http://schemas.openxmlformats.org/markup-compatibility/2006">
-    <mc:Choice xmlns="" xmlns:p14="http://schemas.microsoft.com/office/powerpoint/2010/main" Requires="p14">
+  <mc:AlternateContent xmlns:mc="http://schemas.openxmlformats.org/markup-compatibility/2006" xmlns:p14="http://schemas.microsoft.com/office/powerpoint/2010/main">
+    <mc:Choice Requires="p14">
       <p:transition spd="med" p14:dur="700">
         <p:fade/>
       </p:transition>
     </mc:Choice>
-    <mc:Fallback>
+    <mc:Fallback xmlns="">
       <p:transition spd="med">
         <p:fade/>
       </p:transition>
@@ -5278,7 +5571,7 @@
           <a:blip r:embed="rId2">
             <a:extLst>
               <a:ext uri="{28A0092B-C50C-407E-A947-70E740481C1C}">
-                <a14:useLocalDpi xmlns="" xmlns:a14="http://schemas.microsoft.com/office/drawing/2010/main" val="0"/>
+                <a14:useLocalDpi xmlns:a14="http://schemas.microsoft.com/office/drawing/2010/main" val="0"/>
               </a:ext>
             </a:extLst>
           </a:blip>
@@ -5305,20 +5598,20 @@
     </p:spTree>
     <p:extLst>
       <p:ext uri="{BB962C8B-B14F-4D97-AF65-F5344CB8AC3E}">
-        <p14:creationId xmlns="" xmlns:p14="http://schemas.microsoft.com/office/powerpoint/2010/main" val="3118755973"/>
+        <p14:creationId xmlns:p14="http://schemas.microsoft.com/office/powerpoint/2010/main" val="3118755973"/>
       </p:ext>
     </p:extLst>
   </p:cSld>
   <p:clrMapOvr>
     <a:masterClrMapping/>
   </p:clrMapOvr>
-  <mc:AlternateContent xmlns:mc="http://schemas.openxmlformats.org/markup-compatibility/2006">
-    <mc:Choice xmlns="" xmlns:p14="http://schemas.microsoft.com/office/powerpoint/2010/main" Requires="p14">
+  <mc:AlternateContent xmlns:mc="http://schemas.openxmlformats.org/markup-compatibility/2006" xmlns:p14="http://schemas.microsoft.com/office/powerpoint/2010/main">
+    <mc:Choice Requires="p14">
       <p:transition spd="med" p14:dur="700">
         <p:fade/>
       </p:transition>
     </mc:Choice>
-    <mc:Fallback>
+    <mc:Fallback xmlns="">
       <p:transition spd="med">
         <p:fade/>
       </p:transition>
@@ -5384,20 +5677,20 @@
     </p:spTree>
     <p:extLst>
       <p:ext uri="{BB962C8B-B14F-4D97-AF65-F5344CB8AC3E}">
-        <p14:creationId xmlns="" xmlns:p14="http://schemas.microsoft.com/office/powerpoint/2010/main" val="604839999"/>
+        <p14:creationId xmlns:p14="http://schemas.microsoft.com/office/powerpoint/2010/main" val="604839999"/>
       </p:ext>
     </p:extLst>
   </p:cSld>
   <p:clrMapOvr>
     <a:masterClrMapping/>
   </p:clrMapOvr>
-  <mc:AlternateContent xmlns:mc="http://schemas.openxmlformats.org/markup-compatibility/2006">
-    <mc:Choice xmlns="" xmlns:p14="http://schemas.microsoft.com/office/powerpoint/2010/main" Requires="p14">
+  <mc:AlternateContent xmlns:mc="http://schemas.openxmlformats.org/markup-compatibility/2006" xmlns:p14="http://schemas.microsoft.com/office/powerpoint/2010/main">
+    <mc:Choice Requires="p14">
       <p:transition spd="med" p14:dur="700">
         <p:fade/>
       </p:transition>
     </mc:Choice>
-    <mc:Fallback>
+    <mc:Fallback xmlns="">
       <p:transition spd="med">
         <p:fade/>
       </p:transition>

</xml_diff>